<commit_message>
uploading final VS code
</commit_message>
<xml_diff>
--- a/Premier League Project PPT.pptx
+++ b/Premier League Project PPT.pptx
@@ -117,7 +117,41 @@
       </a:defRPr>
     </a:lvl9pPr>
   </p:defaultTextStyle>
+  <p:extLst>
+    <p:ext uri="{EFAFB233-063F-42B5-8137-9DF3F51BA10A}">
+      <p15:sldGuideLst xmlns:p15="http://schemas.microsoft.com/office/powerpoint/2012/main"/>
+    </p:ext>
+  </p:extLst>
 </p:presentation>
+</file>
+
+<file path=ppt/changesInfos/changesInfo1.xml><?xml version="1.0" encoding="utf-8"?>
+<pc:chgInfo xmlns:a="http://schemas.openxmlformats.org/drawingml/2006/main" xmlns:r="http://schemas.openxmlformats.org/officeDocument/2006/relationships" xmlns:ac="http://schemas.microsoft.com/office/drawing/2013/main/command" xmlns:pc="http://schemas.microsoft.com/office/powerpoint/2013/main/command">
+  <pc:docChgLst>
+    <pc:chgData name="Riddhi Sodagar" userId="84186b4ce28f5cc8" providerId="LiveId" clId="{6DA42ABD-154C-442D-98A9-A3E08C36DC1D}"/>
+    <pc:docChg chg="modSld">
+      <pc:chgData name="Riddhi Sodagar" userId="84186b4ce28f5cc8" providerId="LiveId" clId="{6DA42ABD-154C-442D-98A9-A3E08C36DC1D}" dt="2023-04-10T22:37:28.203" v="0" actId="1076"/>
+      <pc:docMkLst>
+        <pc:docMk/>
+      </pc:docMkLst>
+      <pc:sldChg chg="modSp mod">
+        <pc:chgData name="Riddhi Sodagar" userId="84186b4ce28f5cc8" providerId="LiveId" clId="{6DA42ABD-154C-442D-98A9-A3E08C36DC1D}" dt="2023-04-10T22:37:28.203" v="0" actId="1076"/>
+        <pc:sldMkLst>
+          <pc:docMk/>
+          <pc:sldMk cId="2451158134" sldId="259"/>
+        </pc:sldMkLst>
+        <pc:picChg chg="mod">
+          <ac:chgData name="Riddhi Sodagar" userId="84186b4ce28f5cc8" providerId="LiveId" clId="{6DA42ABD-154C-442D-98A9-A3E08C36DC1D}" dt="2023-04-10T22:37:28.203" v="0" actId="1076"/>
+          <ac:picMkLst>
+            <pc:docMk/>
+            <pc:sldMk cId="2451158134" sldId="259"/>
+            <ac:picMk id="5" creationId="{2D0B707F-13BB-34E9-3630-B936D55AE31F}"/>
+          </ac:picMkLst>
+        </pc:picChg>
+      </pc:sldChg>
+    </pc:docChg>
+  </pc:docChgLst>
+</pc:chgInfo>
 </file>
 
 <file path=ppt/diagrams/colors1.xml><?xml version="1.0" encoding="utf-8"?>
@@ -8912,7 +8946,7 @@
           <a:p>
             <a:fld id="{05142523-8F02-4DD2-80FD-9F61B02D82E0}" type="datetimeFigureOut">
               <a:rPr lang="en-US" smtClean="0"/>
-              <a:t>4/6/2023</a:t>
+              <a:t>4/10/2023</a:t>
             </a:fld>
             <a:endParaRPr lang="en-US"/>
           </a:p>
@@ -9123,7 +9157,7 @@
           <a:p>
             <a:fld id="{05142523-8F02-4DD2-80FD-9F61B02D82E0}" type="datetimeFigureOut">
               <a:rPr lang="en-US" smtClean="0"/>
-              <a:t>4/6/2023</a:t>
+              <a:t>4/10/2023</a:t>
             </a:fld>
             <a:endParaRPr lang="en-US"/>
           </a:p>
@@ -9338,7 +9372,7 @@
           <a:p>
             <a:fld id="{05142523-8F02-4DD2-80FD-9F61B02D82E0}" type="datetimeFigureOut">
               <a:rPr lang="en-US" smtClean="0"/>
-              <a:t>4/6/2023</a:t>
+              <a:t>4/10/2023</a:t>
             </a:fld>
             <a:endParaRPr lang="en-US"/>
           </a:p>
@@ -9539,7 +9573,7 @@
           <a:p>
             <a:fld id="{05142523-8F02-4DD2-80FD-9F61B02D82E0}" type="datetimeFigureOut">
               <a:rPr lang="en-US" smtClean="0"/>
-              <a:t>4/6/2023</a:t>
+              <a:t>4/10/2023</a:t>
             </a:fld>
             <a:endParaRPr lang="en-US"/>
           </a:p>
@@ -9818,7 +9852,7 @@
           <a:p>
             <a:fld id="{05142523-8F02-4DD2-80FD-9F61B02D82E0}" type="datetimeFigureOut">
               <a:rPr lang="en-US" smtClean="0"/>
-              <a:t>4/6/2023</a:t>
+              <a:t>4/10/2023</a:t>
             </a:fld>
             <a:endParaRPr lang="en-US"/>
           </a:p>
@@ -10086,7 +10120,7 @@
           <a:p>
             <a:fld id="{05142523-8F02-4DD2-80FD-9F61B02D82E0}" type="datetimeFigureOut">
               <a:rPr lang="en-US" smtClean="0"/>
-              <a:t>4/6/2023</a:t>
+              <a:t>4/10/2023</a:t>
             </a:fld>
             <a:endParaRPr lang="en-US"/>
           </a:p>
@@ -10502,7 +10536,7 @@
           <a:p>
             <a:fld id="{05142523-8F02-4DD2-80FD-9F61B02D82E0}" type="datetimeFigureOut">
               <a:rPr lang="en-US" smtClean="0"/>
-              <a:t>4/6/2023</a:t>
+              <a:t>4/10/2023</a:t>
             </a:fld>
             <a:endParaRPr lang="en-US"/>
           </a:p>
@@ -10651,7 +10685,7 @@
           <a:p>
             <a:fld id="{05142523-8F02-4DD2-80FD-9F61B02D82E0}" type="datetimeFigureOut">
               <a:rPr lang="en-US" smtClean="0"/>
-              <a:t>4/6/2023</a:t>
+              <a:t>4/10/2023</a:t>
             </a:fld>
             <a:endParaRPr lang="en-US"/>
           </a:p>
@@ -10777,7 +10811,7 @@
           <a:p>
             <a:fld id="{05142523-8F02-4DD2-80FD-9F61B02D82E0}" type="datetimeFigureOut">
               <a:rPr lang="en-US" smtClean="0"/>
-              <a:t>4/6/2023</a:t>
+              <a:t>4/10/2023</a:t>
             </a:fld>
             <a:endParaRPr lang="en-US"/>
           </a:p>
@@ -11028,7 +11062,7 @@
           <a:p>
             <a:fld id="{05142523-8F02-4DD2-80FD-9F61B02D82E0}" type="datetimeFigureOut">
               <a:rPr lang="en-US" smtClean="0"/>
-              <a:t>4/6/2023</a:t>
+              <a:t>4/10/2023</a:t>
             </a:fld>
             <a:endParaRPr lang="en-US"/>
           </a:p>
@@ -11473,7 +11507,7 @@
           <a:p>
             <a:fld id="{05142523-8F02-4DD2-80FD-9F61B02D82E0}" type="datetimeFigureOut">
               <a:rPr lang="en-US" smtClean="0"/>
-              <a:t>4/6/2023</a:t>
+              <a:t>4/10/2023</a:t>
             </a:fld>
             <a:endParaRPr lang="en-US"/>
           </a:p>
@@ -11800,7 +11834,7 @@
           <a:p>
             <a:fld id="{05142523-8F02-4DD2-80FD-9F61B02D82E0}" type="datetimeFigureOut">
               <a:rPr lang="en-US" smtClean="0"/>
-              <a:t>4/6/2023</a:t>
+              <a:t>4/10/2023</a:t>
             </a:fld>
             <a:endParaRPr lang="en-US"/>
           </a:p>
@@ -15415,17 +15449,6 @@
               </a:spcAft>
             </a:pPr>
             <a:r>
-              <a:rPr lang="en-US" kern="100">
-                <a:solidFill>
-                  <a:srgbClr val="00B0F0"/>
-                </a:solidFill>
-                <a:latin typeface="Calibri" panose="020F0502020204030204" pitchFamily="34" charset="0"/>
-                <a:ea typeface="Calibri" panose="020F0502020204030204" pitchFamily="34" charset="0"/>
-                <a:cs typeface="Times New Roman" panose="02020603050405020304" pitchFamily="18" charset="0"/>
-              </a:rPr>
-              <a:t>Open For Questions</a:t>
-            </a:r>
-            <a:r>
               <a:rPr lang="en-US" kern="100" dirty="0">
                 <a:solidFill>
                   <a:srgbClr val="00B0F0"/>
@@ -15434,7 +15457,7 @@
                 <a:ea typeface="Calibri" panose="020F0502020204030204" pitchFamily="34" charset="0"/>
                 <a:cs typeface="Times New Roman" panose="02020603050405020304" pitchFamily="18" charset="0"/>
               </a:rPr>
-              <a:t>:</a:t>
+              <a:t>Open For Questions:</a:t>
             </a:r>
             <a:endParaRPr lang="en-US" sz="1800" kern="100" dirty="0">
               <a:solidFill>
@@ -16995,7 +17018,7 @@
         </p:blipFill>
         <p:spPr>
           <a:xfrm>
-            <a:off x="602507" y="1853755"/>
+            <a:off x="512285" y="1310616"/>
             <a:ext cx="7160362" cy="4616687"/>
           </a:xfrm>
           <a:prstGeom prst="rect">

</xml_diff>